<commit_message>
Presentation update im file todo.txt sind noch Änderungsvorschläge bzw. Erweierungsmaßnahmen
</commit_message>
<xml_diff>
--- a/Documentation/Praesentation/TechnicalPart.pptx
+++ b/Documentation/Praesentation/TechnicalPart.pptx
@@ -29,7 +29,7 @@
     <p:sldId id="275" r:id="rId20"/>
     <p:sldId id="276" r:id="rId21"/>
     <p:sldId id="277" r:id="rId22"/>
-    <p:sldId id="278" r:id="rId23"/>
+    <p:sldId id="282" r:id="rId23"/>
     <p:sldId id="279" r:id="rId24"/>
     <p:sldId id="280" r:id="rId25"/>
   </p:sldIdLst>
@@ -1079,6 +1079,202 @@
           <a:lstStyle/>
           <a:p>
             <a:r>
+              <a:rPr lang="de-AT" dirty="0" smtClean="0"/>
+              <a:t>This codesample </a:t>
+            </a:r>
+            <a:r>
+              <a:rPr lang="de-AT" dirty="0" err="1" smtClean="0"/>
+              <a:t>shows</a:t>
+            </a:r>
+            <a:r>
+              <a:rPr lang="de-AT" dirty="0" smtClean="0"/>
+              <a:t> </a:t>
+            </a:r>
+            <a:r>
+              <a:rPr lang="de-AT" dirty="0" err="1" smtClean="0"/>
+              <a:t>how</a:t>
+            </a:r>
+            <a:r>
+              <a:rPr lang="de-AT" dirty="0" smtClean="0"/>
+              <a:t> easy </a:t>
+            </a:r>
+            <a:r>
+              <a:rPr lang="de-AT" dirty="0" err="1" smtClean="0"/>
+              <a:t>it</a:t>
+            </a:r>
+            <a:r>
+              <a:rPr lang="de-AT" dirty="0" smtClean="0"/>
+              <a:t> </a:t>
+            </a:r>
+            <a:r>
+              <a:rPr lang="de-AT" dirty="0" err="1" smtClean="0"/>
+              <a:t>is</a:t>
+            </a:r>
+            <a:r>
+              <a:rPr lang="de-AT" baseline="0" dirty="0" smtClean="0"/>
+              <a:t> </a:t>
+            </a:r>
+            <a:r>
+              <a:rPr lang="de-AT" baseline="0" dirty="0" err="1" smtClean="0"/>
+              <a:t>to</a:t>
+            </a:r>
+            <a:r>
+              <a:rPr lang="de-AT" baseline="0" dirty="0" smtClean="0"/>
+              <a:t> </a:t>
+            </a:r>
+            <a:r>
+              <a:rPr lang="de-AT" baseline="0" dirty="0" err="1" smtClean="0"/>
+              <a:t>use</a:t>
+            </a:r>
+            <a:r>
+              <a:rPr lang="de-AT" baseline="0" dirty="0" smtClean="0"/>
+              <a:t> </a:t>
+            </a:r>
+            <a:r>
+              <a:rPr lang="de-AT" baseline="0" dirty="0" err="1" smtClean="0"/>
+              <a:t>ajax</a:t>
+            </a:r>
+            <a:r>
+              <a:rPr lang="de-AT" baseline="0" dirty="0" smtClean="0"/>
+              <a:t> </a:t>
+            </a:r>
+            <a:r>
+              <a:rPr lang="de-AT" baseline="0" dirty="0" err="1" smtClean="0"/>
+              <a:t>with</a:t>
+            </a:r>
+            <a:r>
+              <a:rPr lang="de-AT" baseline="0" dirty="0" smtClean="0"/>
+              <a:t> </a:t>
+            </a:r>
+            <a:r>
+              <a:rPr lang="de-AT" baseline="0" dirty="0" err="1" smtClean="0"/>
+              <a:t>jsf</a:t>
+            </a:r>
+            <a:r>
+              <a:rPr lang="de-AT" baseline="0" dirty="0" smtClean="0"/>
+              <a:t>. </a:t>
+            </a:r>
+            <a:r>
+              <a:rPr lang="de-AT" baseline="0" dirty="0" err="1" smtClean="0"/>
+              <a:t>Only</a:t>
+            </a:r>
+            <a:r>
+              <a:rPr lang="de-AT" baseline="0" dirty="0" smtClean="0"/>
+              <a:t> </a:t>
+            </a:r>
+            <a:r>
+              <a:rPr lang="de-AT" baseline="0" dirty="0" err="1" smtClean="0"/>
+              <a:t>the</a:t>
+            </a:r>
+            <a:r>
+              <a:rPr lang="de-AT" baseline="0" dirty="0" smtClean="0"/>
+              <a:t> &lt;</a:t>
+            </a:r>
+            <a:r>
+              <a:rPr lang="de-AT" baseline="0" dirty="0" err="1" smtClean="0"/>
+              <a:t>f:ajax</a:t>
+            </a:r>
+            <a:r>
+              <a:rPr lang="de-AT" baseline="0" dirty="0" smtClean="0"/>
+              <a:t> tag </a:t>
+            </a:r>
+            <a:r>
+              <a:rPr lang="de-AT" baseline="0" dirty="0" err="1" smtClean="0"/>
+              <a:t>is</a:t>
+            </a:r>
+            <a:r>
+              <a:rPr lang="de-AT" baseline="0" dirty="0" smtClean="0"/>
+              <a:t> </a:t>
+            </a:r>
+            <a:r>
+              <a:rPr lang="de-AT" baseline="0" smtClean="0"/>
+              <a:t>needed</a:t>
+            </a:r>
+            <a:endParaRPr lang="de-AT" dirty="0"/>
+          </a:p>
+        </p:txBody>
+      </p:sp>
+      <p:sp>
+        <p:nvSpPr>
+          <p:cNvPr id="4" name="Foliennummernplatzhalter 3"/>
+          <p:cNvSpPr>
+            <a:spLocks noGrp="1"/>
+          </p:cNvSpPr>
+          <p:nvPr>
+            <p:ph type="sldNum" sz="quarter" idx="10"/>
+          </p:nvPr>
+        </p:nvSpPr>
+        <p:spPr/>
+        <p:txBody>
+          <a:bodyPr/>
+          <a:lstStyle/>
+          <a:p>
+            <a:fld id="{8FA8A2D1-8AFF-4635-BD05-DAD4A81F376D}" type="slidenum">
+              <a:rPr lang="de-AT" smtClean="0"/>
+              <a:t>22</a:t>
+            </a:fld>
+            <a:endParaRPr lang="de-AT"/>
+          </a:p>
+        </p:txBody>
+      </p:sp>
+    </p:spTree>
+    <p:extLst>
+      <p:ext uri="{BB962C8B-B14F-4D97-AF65-F5344CB8AC3E}">
+        <p14:creationId xmlns:p14="http://schemas.microsoft.com/office/powerpoint/2010/main" val="3570326798"/>
+      </p:ext>
+    </p:extLst>
+  </p:cSld>
+  <p:clrMapOvr>
+    <a:masterClrMapping/>
+  </p:clrMapOvr>
+</p:notes>
+</file>
+
+<file path=ppt/notesSlides/notesSlide14.xml><?xml version="1.0" encoding="utf-8"?>
+<p:notes xmlns:a="http://schemas.openxmlformats.org/drawingml/2006/main" xmlns:r="http://schemas.openxmlformats.org/officeDocument/2006/relationships" xmlns:p="http://schemas.openxmlformats.org/presentationml/2006/main">
+  <p:cSld>
+    <p:spTree>
+      <p:nvGrpSpPr>
+        <p:cNvPr id="1" name=""/>
+        <p:cNvGrpSpPr/>
+        <p:nvPr/>
+      </p:nvGrpSpPr>
+      <p:grpSpPr>
+        <a:xfrm>
+          <a:off x="0" y="0"/>
+          <a:ext cx="0" cy="0"/>
+          <a:chOff x="0" y="0"/>
+          <a:chExt cx="0" cy="0"/>
+        </a:xfrm>
+      </p:grpSpPr>
+      <p:sp>
+        <p:nvSpPr>
+          <p:cNvPr id="2" name="Folienbildplatzhalter 1"/>
+          <p:cNvSpPr>
+            <a:spLocks noGrp="1" noRot="1" noChangeAspect="1"/>
+          </p:cNvSpPr>
+          <p:nvPr>
+            <p:ph type="sldImg"/>
+          </p:nvPr>
+        </p:nvSpPr>
+        <p:spPr/>
+      </p:sp>
+      <p:sp>
+        <p:nvSpPr>
+          <p:cNvPr id="3" name="Notizenplatzhalter 2"/>
+          <p:cNvSpPr>
+            <a:spLocks noGrp="1"/>
+          </p:cNvSpPr>
+          <p:nvPr>
+            <p:ph type="body" idx="1"/>
+          </p:nvPr>
+        </p:nvSpPr>
+        <p:spPr/>
+        <p:txBody>
+          <a:bodyPr/>
+          <a:lstStyle/>
+          <a:p>
+            <a:r>
               <a:rPr lang="de-AT" dirty="0" err="1" smtClean="0"/>
               <a:t>Developement</a:t>
             </a:r>
@@ -1146,7 +1342,7 @@
 </p:notes>
 </file>
 
-<file path=ppt/notesSlides/notesSlide14.xml><?xml version="1.0" encoding="utf-8"?>
+<file path=ppt/notesSlides/notesSlide15.xml><?xml version="1.0" encoding="utf-8"?>
 <p:notes xmlns:a="http://schemas.openxmlformats.org/drawingml/2006/main" xmlns:r="http://schemas.openxmlformats.org/officeDocument/2006/relationships" xmlns:p="http://schemas.openxmlformats.org/presentationml/2006/main">
   <p:cSld>
     <p:spTree>
@@ -9499,11 +9695,7 @@
             </a:r>
             <a:r>
               <a:rPr lang="de-AT" dirty="0" smtClean="0"/>
-              <a:t> Software </a:t>
-            </a:r>
-            <a:r>
-              <a:rPr lang="de-AT" dirty="0" smtClean="0"/>
-              <a:t>Modules</a:t>
+              <a:t> Software Modules</a:t>
             </a:r>
           </a:p>
           <a:p>
@@ -9512,18 +9704,17 @@
               <a:t>JSf</a:t>
             </a:r>
             <a:r>
+              <a:rPr lang="de-AT" smtClean="0"/>
+              <a:t> </a:t>
+            </a:r>
+            <a:r>
+              <a:rPr lang="de-AT" smtClean="0"/>
+              <a:t>&amp;Ajax </a:t>
+            </a:r>
+            <a:r>
               <a:rPr lang="de-AT" dirty="0" smtClean="0"/>
-              <a:t> </a:t>
-            </a:r>
-            <a:r>
-              <a:rPr lang="de-AT" dirty="0" err="1" smtClean="0"/>
-              <a:t>with</a:t>
-            </a:r>
-            <a:r>
-              <a:rPr lang="de-AT" dirty="0" smtClean="0"/>
-              <a:t> Ajax (web-reservation)</a:t>
-            </a:r>
-            <a:endParaRPr lang="de-AT" dirty="0" smtClean="0"/>
+              <a:t>(web-reservation)</a:t>
+            </a:r>
           </a:p>
           <a:p>
             <a:endParaRPr lang="de-AT" dirty="0" smtClean="0"/>
@@ -9854,32 +10045,16 @@
           <a:lstStyle/>
           <a:p>
             <a:r>
-              <a:rPr lang="de-AT" dirty="0" err="1" smtClean="0"/>
-              <a:t>Jsf</a:t>
-            </a:r>
-            <a:r>
               <a:rPr lang="de-AT" dirty="0" smtClean="0"/>
-              <a:t> </a:t>
-            </a:r>
-            <a:r>
-              <a:rPr lang="de-AT" dirty="0" err="1" smtClean="0"/>
-              <a:t>with</a:t>
-            </a:r>
-            <a:r>
-              <a:rPr lang="de-AT" dirty="0" smtClean="0"/>
-              <a:t> </a:t>
-            </a:r>
-            <a:r>
-              <a:rPr lang="de-AT" dirty="0" err="1" smtClean="0"/>
-              <a:t>ajax</a:t>
-            </a:r>
-            <a:endParaRPr lang="en-GB" dirty="0"/>
-          </a:p>
-        </p:txBody>
-      </p:sp>
-      <p:sp>
-        <p:nvSpPr>
-          <p:cNvPr id="3" name="Inhaltsplatzhalter 2"/>
+              <a:t>JSF &amp; Ajax</a:t>
+            </a:r>
+            <a:endParaRPr lang="de-AT" dirty="0"/>
+          </a:p>
+        </p:txBody>
+      </p:sp>
+      <p:sp>
+        <p:nvSpPr>
+          <p:cNvPr id="5" name="Inhaltsplatzhalter 4"/>
           <p:cNvSpPr>
             <a:spLocks noGrp="1"/>
           </p:cNvSpPr>
@@ -9889,31 +10064,144 @@
         </p:nvSpPr>
         <p:spPr/>
         <p:txBody>
-          <a:bodyPr/>
+          <a:bodyPr>
+            <a:normAutofit/>
+          </a:bodyPr>
           <a:lstStyle/>
           <a:p>
-            <a:endParaRPr lang="en-GB"/>
-          </a:p>
-        </p:txBody>
-      </p:sp>
+            <a:pPr marL="0" indent="0">
+              <a:buNone/>
+            </a:pPr>
+            <a:r>
+              <a:rPr lang="en-US" dirty="0" smtClean="0"/>
+              <a:t>Ajax: Built in in JSF since version 2.0</a:t>
+            </a:r>
+          </a:p>
+          <a:p>
+            <a:pPr marL="0" indent="0">
+              <a:buNone/>
+            </a:pPr>
+            <a:r>
+              <a:rPr lang="en-US" dirty="0"/>
+              <a:t>	</a:t>
+            </a:r>
+            <a:r>
+              <a:rPr lang="en-US" dirty="0" smtClean="0"/>
+              <a:t>- easy to use</a:t>
+            </a:r>
+          </a:p>
+          <a:p>
+            <a:pPr marL="0" indent="0">
+              <a:buNone/>
+            </a:pPr>
+            <a:endParaRPr lang="en-US" dirty="0" smtClean="0"/>
+          </a:p>
+          <a:p>
+            <a:pPr marL="0" indent="0">
+              <a:buNone/>
+            </a:pPr>
+            <a:endParaRPr lang="en-US" dirty="0" smtClean="0"/>
+          </a:p>
+          <a:p>
+            <a:pPr marL="0" indent="0">
+              <a:buNone/>
+            </a:pPr>
+            <a:endParaRPr lang="en-US" dirty="0"/>
+          </a:p>
+          <a:p>
+            <a:pPr marL="0" indent="0">
+              <a:buNone/>
+            </a:pPr>
+            <a:endParaRPr lang="en-US" dirty="0"/>
+          </a:p>
+          <a:p>
+            <a:pPr marL="0" indent="0">
+              <a:buNone/>
+            </a:pPr>
+            <a:endParaRPr lang="en-US" dirty="0"/>
+          </a:p>
+          <a:p>
+            <a:pPr marL="0" indent="0">
+              <a:buNone/>
+            </a:pPr>
+            <a:endParaRPr lang="en-US" dirty="0" smtClean="0"/>
+          </a:p>
+        </p:txBody>
+      </p:sp>
+      <p:pic>
+        <p:nvPicPr>
+          <p:cNvPr id="1027" name="Picture 3"/>
+          <p:cNvPicPr>
+            <a:picLocks noChangeAspect="1" noChangeArrowheads="1"/>
+          </p:cNvPicPr>
+          <p:nvPr/>
+        </p:nvPicPr>
+        <p:blipFill>
+          <a:blip r:embed="rId3">
+            <a:extLst>
+              <a:ext uri="{28A0092B-C50C-407E-A947-70E740481C1C}">
+                <a14:useLocalDpi xmlns:a14="http://schemas.microsoft.com/office/drawing/2010/main" val="0"/>
+              </a:ext>
+            </a:extLst>
+          </a:blip>
+          <a:srcRect/>
+          <a:stretch>
+            <a:fillRect/>
+          </a:stretch>
+        </p:blipFill>
+        <p:spPr bwMode="auto">
+          <a:xfrm>
+            <a:off x="765430" y="3212976"/>
+            <a:ext cx="7316328" cy="1843261"/>
+          </a:xfrm>
+          <a:prstGeom prst="rect">
+            <a:avLst/>
+          </a:prstGeom>
+          <a:noFill/>
+          <a:ln>
+            <a:noFill/>
+          </a:ln>
+          <a:effectLst/>
+          <a:extLst>
+            <a:ext uri="{909E8E84-426E-40DD-AFC4-6F175D3DCCD1}">
+              <a14:hiddenFill xmlns:a14="http://schemas.microsoft.com/office/drawing/2010/main">
+                <a:solidFill>
+                  <a:schemeClr val="accent1"/>
+                </a:solidFill>
+              </a14:hiddenFill>
+            </a:ext>
+            <a:ext uri="{91240B29-F687-4F45-9708-019B960494DF}">
+              <a14:hiddenLine xmlns:a14="http://schemas.microsoft.com/office/drawing/2010/main" w="9525">
+                <a:solidFill>
+                  <a:schemeClr val="tx1"/>
+                </a:solidFill>
+                <a:miter lim="800000"/>
+                <a:headEnd/>
+                <a:tailEnd/>
+              </a14:hiddenLine>
+            </a:ext>
+            <a:ext uri="{AF507438-7753-43E0-B8FC-AC1667EBCBE1}">
+              <a14:hiddenEffects xmlns:a14="http://schemas.microsoft.com/office/drawing/2010/main">
+                <a:effectLst>
+                  <a:outerShdw dist="35921" dir="2700000" algn="ctr" rotWithShape="0">
+                    <a:schemeClr val="bg2"/>
+                  </a:outerShdw>
+                </a:effectLst>
+              </a14:hiddenEffects>
+            </a:ext>
+          </a:extLst>
+        </p:spPr>
+      </p:pic>
     </p:spTree>
     <p:extLst>
       <p:ext uri="{BB962C8B-B14F-4D97-AF65-F5344CB8AC3E}">
-        <p14:creationId xmlns:p14="http://schemas.microsoft.com/office/powerpoint/2010/main" val="2506207340"/>
+        <p14:creationId xmlns:p14="http://schemas.microsoft.com/office/powerpoint/2010/main" val="1525579452"/>
       </p:ext>
     </p:extLst>
   </p:cSld>
   <p:clrMapOvr>
     <a:masterClrMapping/>
   </p:clrMapOvr>
-  <mc:AlternateContent xmlns:mc="http://schemas.openxmlformats.org/markup-compatibility/2006">
-    <mc:Choice xmlns:p14="http://schemas.microsoft.com/office/powerpoint/2010/main" Requires="p14">
-      <p:transition spd="slow" p14:dur="2000"/>
-    </mc:Choice>
-    <mc:Fallback>
-      <p:transition spd="slow"/>
-    </mc:Fallback>
-  </mc:AlternateContent>
 </p:sld>
 </file>
 

</xml_diff>